<commit_message>
Added Hands On Demos - Day 17.
</commit_message>
<xml_diff>
--- a/Day 17/Slides/2. Should You React/should-you-react-slides.pptx
+++ b/Day 17/Slides/2. Should You React/should-you-react-slides.pptx
@@ -15749,6 +15749,10 @@
           </p:nvPr>
         </p:nvSpPr>
         <p:spPr>
+          <a:xfrm>
+            <a:off x="3203664" y="2916457"/>
+            <a:ext cx="5784670" cy="984250"/>
+          </a:xfrm>
           <a:prstGeom prst="rect">
             <a:avLst/>
           </a:prstGeom>
@@ -15807,10 +15811,10 @@
               <a:t> </a:t>
             </a:r>
             <a:r>
-              <a:rPr spc="105" dirty="0"/>
-              <a:t>4</a:t>
-            </a:r>
-            <a:endParaRPr spc="105" dirty="0"/>
+              <a:rPr lang="en-US" spc="-150" dirty="0"/>
+              <a:t>5</a:t>
+            </a:r>
+            <a:endParaRPr lang="en-US" spc="-150" dirty="0"/>
           </a:p>
         </p:txBody>
       </p:sp>

</xml_diff>